<commit_message>
Added installation instructions to PPT
</commit_message>
<xml_diff>
--- a/others/PyTable_Intro.pptx
+++ b/others/PyTable_Intro.pptx
@@ -5,7 +5,7 @@
     <p:sldMasterId id="2147483648" r:id="rId1"/>
   </p:sldMasterIdLst>
   <p:notesMasterIdLst>
-    <p:notesMasterId r:id="rId22"/>
+    <p:notesMasterId r:id="rId23"/>
   </p:notesMasterIdLst>
   <p:sldIdLst>
     <p:sldId id="256" r:id="rId2"/>
@@ -26,8 +26,9 @@
     <p:sldId id="272" r:id="rId17"/>
     <p:sldId id="273" r:id="rId18"/>
     <p:sldId id="274" r:id="rId19"/>
-    <p:sldId id="270" r:id="rId20"/>
-    <p:sldId id="275" r:id="rId21"/>
+    <p:sldId id="276" r:id="rId20"/>
+    <p:sldId id="270" r:id="rId21"/>
+    <p:sldId id="275" r:id="rId22"/>
   </p:sldIdLst>
   <p:sldSz cx="12192000" cy="6858000"/>
   <p:notesSz cx="6858000" cy="9144000"/>
@@ -126,6 +127,11 @@
       </a:defRPr>
     </a:lvl9pPr>
   </p:defaultTextStyle>
+  <p:extLst>
+    <p:ext uri="{EFAFB233-063F-42B5-8137-9DF3F51BA10A}">
+      <p15:sldGuideLst xmlns:p15="http://schemas.microsoft.com/office/powerpoint/2012/main"/>
+    </p:ext>
+  </p:extLst>
 </p:presentation>
 </file>
 
@@ -211,7 +217,7 @@
           <a:p>
             <a:fld id="{85BD03B5-5F6B-4473-AD28-D03015FB673B}" type="datetimeFigureOut">
               <a:rPr lang="en-US" smtClean="0"/>
-              <a:t>3/17/2021</a:t>
+              <a:t>3/18/2021</a:t>
             </a:fld>
             <a:endParaRPr lang="en-US"/>
           </a:p>
@@ -694,7 +700,7 @@
           <a:p>
             <a:fld id="{D9B67237-F028-48D3-A471-408210D047B7}" type="datetimeFigureOut">
               <a:rPr lang="en-US" smtClean="0"/>
-              <a:t>3/17/2021</a:t>
+              <a:t>3/18/2021</a:t>
             </a:fld>
             <a:endParaRPr lang="en-US"/>
           </a:p>
@@ -864,7 +870,7 @@
           <a:p>
             <a:fld id="{D9B67237-F028-48D3-A471-408210D047B7}" type="datetimeFigureOut">
               <a:rPr lang="en-US" smtClean="0"/>
-              <a:t>3/17/2021</a:t>
+              <a:t>3/18/2021</a:t>
             </a:fld>
             <a:endParaRPr lang="en-US"/>
           </a:p>
@@ -1044,7 +1050,7 @@
           <a:p>
             <a:fld id="{D9B67237-F028-48D3-A471-408210D047B7}" type="datetimeFigureOut">
               <a:rPr lang="en-US" smtClean="0"/>
-              <a:t>3/17/2021</a:t>
+              <a:t>3/18/2021</a:t>
             </a:fld>
             <a:endParaRPr lang="en-US"/>
           </a:p>
@@ -1214,7 +1220,7 @@
           <a:p>
             <a:fld id="{D9B67237-F028-48D3-A471-408210D047B7}" type="datetimeFigureOut">
               <a:rPr lang="en-US" smtClean="0"/>
-              <a:t>3/17/2021</a:t>
+              <a:t>3/18/2021</a:t>
             </a:fld>
             <a:endParaRPr lang="en-US"/>
           </a:p>
@@ -1460,7 +1466,7 @@
           <a:p>
             <a:fld id="{D9B67237-F028-48D3-A471-408210D047B7}" type="datetimeFigureOut">
               <a:rPr lang="en-US" smtClean="0"/>
-              <a:t>3/17/2021</a:t>
+              <a:t>3/18/2021</a:t>
             </a:fld>
             <a:endParaRPr lang="en-US"/>
           </a:p>
@@ -1692,7 +1698,7 @@
           <a:p>
             <a:fld id="{D9B67237-F028-48D3-A471-408210D047B7}" type="datetimeFigureOut">
               <a:rPr lang="en-US" smtClean="0"/>
-              <a:t>3/17/2021</a:t>
+              <a:t>3/18/2021</a:t>
             </a:fld>
             <a:endParaRPr lang="en-US"/>
           </a:p>
@@ -2059,7 +2065,7 @@
           <a:p>
             <a:fld id="{D9B67237-F028-48D3-A471-408210D047B7}" type="datetimeFigureOut">
               <a:rPr lang="en-US" smtClean="0"/>
-              <a:t>3/17/2021</a:t>
+              <a:t>3/18/2021</a:t>
             </a:fld>
             <a:endParaRPr lang="en-US"/>
           </a:p>
@@ -2177,7 +2183,7 @@
           <a:p>
             <a:fld id="{D9B67237-F028-48D3-A471-408210D047B7}" type="datetimeFigureOut">
               <a:rPr lang="en-US" smtClean="0"/>
-              <a:t>3/17/2021</a:t>
+              <a:t>3/18/2021</a:t>
             </a:fld>
             <a:endParaRPr lang="en-US"/>
           </a:p>
@@ -2272,7 +2278,7 @@
           <a:p>
             <a:fld id="{D9B67237-F028-48D3-A471-408210D047B7}" type="datetimeFigureOut">
               <a:rPr lang="en-US" smtClean="0"/>
-              <a:t>3/17/2021</a:t>
+              <a:t>3/18/2021</a:t>
             </a:fld>
             <a:endParaRPr lang="en-US"/>
           </a:p>
@@ -2549,7 +2555,7 @@
           <a:p>
             <a:fld id="{D9B67237-F028-48D3-A471-408210D047B7}" type="datetimeFigureOut">
               <a:rPr lang="en-US" smtClean="0"/>
-              <a:t>3/17/2021</a:t>
+              <a:t>3/18/2021</a:t>
             </a:fld>
             <a:endParaRPr lang="en-US"/>
           </a:p>
@@ -2802,7 +2808,7 @@
           <a:p>
             <a:fld id="{D9B67237-F028-48D3-A471-408210D047B7}" type="datetimeFigureOut">
               <a:rPr lang="en-US" smtClean="0"/>
-              <a:t>3/17/2021</a:t>
+              <a:t>3/18/2021</a:t>
             </a:fld>
             <a:endParaRPr lang="en-US"/>
           </a:p>
@@ -3015,7 +3021,7 @@
           <a:p>
             <a:fld id="{D9B67237-F028-48D3-A471-408210D047B7}" type="datetimeFigureOut">
               <a:rPr lang="en-US" smtClean="0"/>
-              <a:t>3/17/2021</a:t>
+              <a:t>3/18/2021</a:t>
             </a:fld>
             <a:endParaRPr lang="en-US"/>
           </a:p>
@@ -6136,17 +6142,19 @@
         </p:nvSpPr>
         <p:spPr>
           <a:xfrm>
-            <a:off x="282019" y="148309"/>
-            <a:ext cx="10515600" cy="1325563"/>
-          </a:xfrm>
-        </p:spPr>
-        <p:txBody>
-          <a:bodyPr/>
+            <a:off x="156557" y="82492"/>
+            <a:ext cx="10515600" cy="823595"/>
+          </a:xfrm>
+        </p:spPr>
+        <p:txBody>
+          <a:bodyPr>
+            <a:normAutofit fontScale="90000"/>
+          </a:bodyPr>
           <a:lstStyle/>
           <a:p>
             <a:r>
               <a:rPr lang="de-DE" sz="5400" b="1" dirty="0" smtClean="0"/>
-              <a:t>TODO</a:t>
+              <a:t>Installation</a:t>
             </a:r>
             <a:endParaRPr lang="en-US" b="1" dirty="0"/>
           </a:p>
@@ -6164,13 +6172,13 @@
         </p:nvSpPr>
         <p:spPr>
           <a:xfrm>
-            <a:off x="282019" y="1278870"/>
-            <a:ext cx="11708876" cy="4351338"/>
+            <a:off x="156557" y="906087"/>
+            <a:ext cx="11805458" cy="5270876"/>
           </a:xfrm>
         </p:spPr>
         <p:txBody>
           <a:bodyPr>
-            <a:normAutofit lnSpcReduction="10000"/>
+            <a:normAutofit fontScale="92500" lnSpcReduction="10000"/>
           </a:bodyPr>
           <a:lstStyle/>
           <a:p>
@@ -6179,59 +6187,128 @@
             </a:pPr>
             <a:r>
               <a:rPr lang="de-DE" dirty="0" smtClean="0"/>
-              <a:t>PyTable is an early implementation. There are a few things that I want to modify in the near future:</a:t>
-            </a:r>
-          </a:p>
-          <a:p>
+              <a:t>I recommend using a simple install procedure:</a:t>
+            </a:r>
+          </a:p>
+          <a:p>
+            <a:pPr marL="0" indent="0">
+              <a:buNone/>
+            </a:pPr>
             <a:r>
               <a:rPr lang="de-DE" dirty="0" smtClean="0"/>
-              <a:t>Set defaults formats for tables that are read and for new columns that are created.</a:t>
-            </a:r>
-          </a:p>
-          <a:p>
-            <a:r>
-              <a:rPr lang="de-DE" dirty="0" smtClean="0"/>
-              <a:t>Implement automatic conversion for columns based on sensible default assumptions (DEFAULT format for dates, etc)</a:t>
-            </a:r>
-          </a:p>
-          <a:p>
-            <a:r>
-              <a:rPr lang="de-DE" dirty="0" smtClean="0"/>
-              <a:t>Clean interface: remove some methods that are similar, rename others to make them easier to remember.</a:t>
-            </a:r>
-          </a:p>
-          <a:p>
-            <a:r>
-              <a:rPr lang="de-DE" dirty="0" smtClean="0"/>
-              <a:t>Implement a few more command line aliases for existing methods. For example, now we have </a:t>
+              <a:t>Copy the source directory to a location such as the path does not have blank spaces. Then, add </a:t>
             </a:r>
             <a:r>
               <a:rPr lang="de-DE" b="1" dirty="0" smtClean="0">
                 <a:solidFill>
-                  <a:schemeClr val="accent2">
+                  <a:srgbClr val="C00000"/>
+                </a:solidFill>
+              </a:rPr>
+              <a:t>ROOT</a:t>
+            </a:r>
+            <a:r>
+              <a:rPr lang="de-DE" dirty="0" smtClean="0"/>
+              <a:t> to your </a:t>
+            </a:r>
+            <a:r>
+              <a:rPr lang="de-DE" b="1" dirty="0" smtClean="0">
+                <a:solidFill>
+                  <a:srgbClr val="C00000"/>
+                </a:solidFill>
+              </a:rPr>
+              <a:t>PYTHONPATH</a:t>
+            </a:r>
+            <a:r>
+              <a:rPr lang="de-DE" dirty="0" smtClean="0"/>
+              <a:t>.</a:t>
+            </a:r>
+          </a:p>
+          <a:p>
+            <a:pPr marL="0" indent="0">
+              <a:buNone/>
+            </a:pPr>
+            <a:endParaRPr lang="de-DE" dirty="0"/>
+          </a:p>
+          <a:p>
+            <a:pPr marL="0" indent="0">
+              <a:buNone/>
+            </a:pPr>
+            <a:r>
+              <a:rPr lang="de-DE" dirty="0" smtClean="0"/>
+              <a:t>For example, for </a:t>
+            </a:r>
+            <a:r>
+              <a:rPr lang="de-DE" b="1" dirty="0" smtClean="0">
+                <a:solidFill>
+                  <a:srgbClr val="C00000"/>
+                </a:solidFill>
+              </a:rPr>
+              <a:t>POWERSHELL</a:t>
+            </a:r>
+            <a:r>
+              <a:rPr lang="de-DE" dirty="0" smtClean="0"/>
+              <a:t> (I recommend using it):</a:t>
+            </a:r>
+          </a:p>
+          <a:p>
+            <a:pPr marL="0" indent="0">
+              <a:buNone/>
+            </a:pPr>
+            <a:r>
+              <a:rPr lang="en-US" b="1" dirty="0"/>
+              <a:t>$</a:t>
+            </a:r>
+            <a:r>
+              <a:rPr lang="en-US" b="1" dirty="0" err="1"/>
+              <a:t>env:PYTHONPATH</a:t>
+            </a:r>
+            <a:r>
+              <a:rPr lang="en-US" b="1" dirty="0" smtClean="0"/>
+              <a:t>=“PATH_TO_ROOT"</a:t>
+            </a:r>
+            <a:endParaRPr lang="en-US" b="1" dirty="0"/>
+          </a:p>
+          <a:p>
+            <a:pPr marL="0" indent="0">
+              <a:buNone/>
+            </a:pPr>
+            <a:r>
+              <a:rPr lang="en-US" i="1" dirty="0" smtClean="0"/>
+              <a:t>Write-Host </a:t>
+            </a:r>
+            <a:r>
+              <a:rPr lang="en-US" i="1" dirty="0"/>
+              <a:t>"NEW: " $</a:t>
+            </a:r>
+            <a:r>
+              <a:rPr lang="en-US" i="1" dirty="0" err="1" smtClean="0"/>
+              <a:t>env:PYTHONPATH</a:t>
+            </a:r>
+            <a:endParaRPr lang="en-US" i="1" dirty="0" smtClean="0"/>
+          </a:p>
+          <a:p>
+            <a:pPr marL="0" indent="0">
+              <a:buNone/>
+            </a:pPr>
+            <a:endParaRPr lang="de-DE" i="1" dirty="0"/>
+          </a:p>
+          <a:p>
+            <a:pPr marL="0" indent="0">
+              <a:buNone/>
+            </a:pPr>
+            <a:r>
+              <a:rPr lang="de-DE" b="1" i="1" dirty="0" smtClean="0">
+                <a:solidFill>
+                  <a:schemeClr val="accent4">
                     <a:lumMod val="75000"/>
                   </a:schemeClr>
                 </a:solidFill>
               </a:rPr>
-              <a:t>t.what() == t.wh()</a:t>
-            </a:r>
-            <a:r>
-              <a:rPr lang="de-DE" dirty="0" smtClean="0"/>
-              <a:t>, and </a:t>
-            </a:r>
-            <a:r>
-              <a:rPr lang="de-DE" b="1" dirty="0" smtClean="0">
-                <a:solidFill>
-                  <a:schemeClr val="accent2">
-                    <a:lumMod val="75000"/>
-                  </a:schemeClr>
-                </a:solidFill>
-              </a:rPr>
-              <a:t>t.head() == t.h()</a:t>
-            </a:r>
-            <a:endParaRPr lang="en-US" b="1" dirty="0">
+              <a:t>You need to do this each time you open a PS window. Otherwise, you can make it permanent by changing the value of the environmental variable in Windows. BE CAREFUL THOUGH, TO NOT MESS UP WITH YOUR INSTALLATION OF PYTHON. It has worked well for me this way, but different software uses different ways to setup Python.</a:t>
+            </a:r>
+            <a:endParaRPr lang="en-US" b="1" i="1" dirty="0">
               <a:solidFill>
-                <a:schemeClr val="accent2">
+                <a:schemeClr val="accent4">
                   <a:lumMod val="75000"/>
                 </a:schemeClr>
               </a:solidFill>
@@ -6242,20 +6319,13 @@
     </p:spTree>
     <p:extLst>
       <p:ext uri="{BB962C8B-B14F-4D97-AF65-F5344CB8AC3E}">
-        <p14:creationId xmlns:p14="http://schemas.microsoft.com/office/powerpoint/2010/main" val="1053410280"/>
+        <p14:creationId xmlns:p14="http://schemas.microsoft.com/office/powerpoint/2010/main" val="3966349228"/>
       </p:ext>
     </p:extLst>
   </p:cSld>
   <p:clrMapOvr>
     <a:masterClrMapping/>
   </p:clrMapOvr>
-  <p:timing>
-    <p:tnLst>
-      <p:par>
-        <p:cTn id="1" dur="indefinite" restart="never" nodeType="tmRoot"/>
-      </p:par>
-    </p:tnLst>
-  </p:timing>
 </p:sld>
 </file>
 
@@ -6384,6 +6454,158 @@
 </file>
 
 <file path=ppt/slides/slide20.xml><?xml version="1.0" encoding="utf-8"?>
+<p:sld xmlns:a="http://schemas.openxmlformats.org/drawingml/2006/main" xmlns:r="http://schemas.openxmlformats.org/officeDocument/2006/relationships" xmlns:p="http://schemas.openxmlformats.org/presentationml/2006/main">
+  <p:cSld>
+    <p:spTree>
+      <p:nvGrpSpPr>
+        <p:cNvPr id="1" name=""/>
+        <p:cNvGrpSpPr/>
+        <p:nvPr/>
+      </p:nvGrpSpPr>
+      <p:grpSpPr>
+        <a:xfrm>
+          <a:off x="0" y="0"/>
+          <a:ext cx="0" cy="0"/>
+          <a:chOff x="0" y="0"/>
+          <a:chExt cx="0" cy="0"/>
+        </a:xfrm>
+      </p:grpSpPr>
+      <p:sp>
+        <p:nvSpPr>
+          <p:cNvPr id="2" name="Title 1"/>
+          <p:cNvSpPr>
+            <a:spLocks noGrp="1"/>
+          </p:cNvSpPr>
+          <p:nvPr>
+            <p:ph type="title"/>
+          </p:nvPr>
+        </p:nvSpPr>
+        <p:spPr>
+          <a:xfrm>
+            <a:off x="282019" y="148309"/>
+            <a:ext cx="10515600" cy="1325563"/>
+          </a:xfrm>
+        </p:spPr>
+        <p:txBody>
+          <a:bodyPr/>
+          <a:lstStyle/>
+          <a:p>
+            <a:r>
+              <a:rPr lang="de-DE" sz="5400" b="1" dirty="0" smtClean="0"/>
+              <a:t>TODO</a:t>
+            </a:r>
+            <a:endParaRPr lang="en-US" b="1" dirty="0"/>
+          </a:p>
+        </p:txBody>
+      </p:sp>
+      <p:sp>
+        <p:nvSpPr>
+          <p:cNvPr id="3" name="Content Placeholder 2"/>
+          <p:cNvSpPr>
+            <a:spLocks noGrp="1"/>
+          </p:cNvSpPr>
+          <p:nvPr>
+            <p:ph idx="1"/>
+          </p:nvPr>
+        </p:nvSpPr>
+        <p:spPr>
+          <a:xfrm>
+            <a:off x="282019" y="1278870"/>
+            <a:ext cx="11708876" cy="4351338"/>
+          </a:xfrm>
+        </p:spPr>
+        <p:txBody>
+          <a:bodyPr>
+            <a:normAutofit lnSpcReduction="10000"/>
+          </a:bodyPr>
+          <a:lstStyle/>
+          <a:p>
+            <a:pPr marL="0" indent="0">
+              <a:buNone/>
+            </a:pPr>
+            <a:r>
+              <a:rPr lang="de-DE" dirty="0" smtClean="0"/>
+              <a:t>PyTable is an early implementation. There are a few things that I want to modify in the near future:</a:t>
+            </a:r>
+          </a:p>
+          <a:p>
+            <a:r>
+              <a:rPr lang="de-DE" dirty="0" smtClean="0"/>
+              <a:t>Set defaults formats for tables that are read and for new columns that are created.</a:t>
+            </a:r>
+          </a:p>
+          <a:p>
+            <a:r>
+              <a:rPr lang="de-DE" dirty="0" smtClean="0"/>
+              <a:t>Implement automatic conversion for columns based on sensible default assumptions (DEFAULT format for dates, etc)</a:t>
+            </a:r>
+          </a:p>
+          <a:p>
+            <a:r>
+              <a:rPr lang="de-DE" dirty="0" smtClean="0"/>
+              <a:t>Clean interface: remove some methods that are similar, rename others to make them easier to remember.</a:t>
+            </a:r>
+          </a:p>
+          <a:p>
+            <a:r>
+              <a:rPr lang="de-DE" dirty="0" smtClean="0"/>
+              <a:t>Implement a few more command line aliases for existing methods. For example, now we have </a:t>
+            </a:r>
+            <a:r>
+              <a:rPr lang="de-DE" b="1" dirty="0" smtClean="0">
+                <a:solidFill>
+                  <a:schemeClr val="accent2">
+                    <a:lumMod val="75000"/>
+                  </a:schemeClr>
+                </a:solidFill>
+              </a:rPr>
+              <a:t>t.what() == t.wh()</a:t>
+            </a:r>
+            <a:r>
+              <a:rPr lang="de-DE" dirty="0" smtClean="0"/>
+              <a:t>, and </a:t>
+            </a:r>
+            <a:r>
+              <a:rPr lang="de-DE" b="1" dirty="0" smtClean="0">
+                <a:solidFill>
+                  <a:schemeClr val="accent2">
+                    <a:lumMod val="75000"/>
+                  </a:schemeClr>
+                </a:solidFill>
+              </a:rPr>
+              <a:t>t.head() == t.h()</a:t>
+            </a:r>
+            <a:endParaRPr lang="en-US" b="1" dirty="0">
+              <a:solidFill>
+                <a:schemeClr val="accent2">
+                  <a:lumMod val="75000"/>
+                </a:schemeClr>
+              </a:solidFill>
+            </a:endParaRPr>
+          </a:p>
+        </p:txBody>
+      </p:sp>
+    </p:spTree>
+    <p:extLst>
+      <p:ext uri="{BB962C8B-B14F-4D97-AF65-F5344CB8AC3E}">
+        <p14:creationId xmlns:p14="http://schemas.microsoft.com/office/powerpoint/2010/main" val="1053410280"/>
+      </p:ext>
+    </p:extLst>
+  </p:cSld>
+  <p:clrMapOvr>
+    <a:masterClrMapping/>
+  </p:clrMapOvr>
+  <p:timing>
+    <p:tnLst>
+      <p:par>
+        <p:cTn id="1" dur="indefinite" restart="never" nodeType="tmRoot"/>
+      </p:par>
+    </p:tnLst>
+  </p:timing>
+</p:sld>
+</file>
+
+<file path=ppt/slides/slide21.xml><?xml version="1.0" encoding="utf-8"?>
 <p:sld xmlns:a="http://schemas.openxmlformats.org/drawingml/2006/main" xmlns:r="http://schemas.openxmlformats.org/officeDocument/2006/relationships" xmlns:p="http://schemas.openxmlformats.org/presentationml/2006/main">
   <p:cSld>
     <p:spTree>

</xml_diff>